<commit_message>
Center Calendar. Add to Presentation.
</commit_message>
<xml_diff>
--- a/GoodWorksElPasoPresentation.pptx
+++ b/GoodWorksElPasoPresentation.pptx
@@ -15,9 +15,11 @@
     <p:sldId id="266" r:id="rId9"/>
     <p:sldId id="261" r:id="rId10"/>
     <p:sldId id="268" r:id="rId11"/>
-    <p:sldId id="270" r:id="rId12"/>
-    <p:sldId id="269" r:id="rId13"/>
-    <p:sldId id="267" r:id="rId14"/>
+    <p:sldId id="271" r:id="rId12"/>
+    <p:sldId id="270" r:id="rId13"/>
+    <p:sldId id="269" r:id="rId14"/>
+    <p:sldId id="272" r:id="rId15"/>
+    <p:sldId id="267" r:id="rId16"/>
   </p:sldIdLst>
   <p:sldSz cx="12192000" cy="6858000"/>
   <p:notesSz cx="6858000" cy="9144000"/>
@@ -637,7 +639,7 @@
           <a:p>
             <a:fld id="{9FCDD19A-6126-4CEB-B614-5FEAC3CD8997}" type="datetimeFigureOut">
               <a:rPr lang="en-US" smtClean="0"/>
-              <a:t>4/27/2019</a:t>
+              <a:t>4/28/2019</a:t>
             </a:fld>
             <a:endParaRPr lang="en-US"/>
           </a:p>
@@ -938,7 +940,7 @@
           <a:p>
             <a:fld id="{9FCDD19A-6126-4CEB-B614-5FEAC3CD8997}" type="datetimeFigureOut">
               <a:rPr lang="en-US" smtClean="0"/>
-              <a:t>4/27/2019</a:t>
+              <a:t>4/28/2019</a:t>
             </a:fld>
             <a:endParaRPr lang="en-US"/>
           </a:p>
@@ -1186,7 +1188,7 @@
           <a:p>
             <a:fld id="{9FCDD19A-6126-4CEB-B614-5FEAC3CD8997}" type="datetimeFigureOut">
               <a:rPr lang="en-US" smtClean="0"/>
-              <a:t>4/27/2019</a:t>
+              <a:t>4/28/2019</a:t>
             </a:fld>
             <a:endParaRPr lang="en-US"/>
           </a:p>
@@ -1726,7 +1728,7 @@
           <a:p>
             <a:fld id="{9FCDD19A-6126-4CEB-B614-5FEAC3CD8997}" type="datetimeFigureOut">
               <a:rPr lang="en-US" smtClean="0"/>
-              <a:t>4/27/2019</a:t>
+              <a:t>4/28/2019</a:t>
             </a:fld>
             <a:endParaRPr lang="en-US"/>
           </a:p>
@@ -1974,7 +1976,7 @@
           <a:p>
             <a:fld id="{9FCDD19A-6126-4CEB-B614-5FEAC3CD8997}" type="datetimeFigureOut">
               <a:rPr lang="en-US" smtClean="0"/>
-              <a:t>4/27/2019</a:t>
+              <a:t>4/28/2019</a:t>
             </a:fld>
             <a:endParaRPr lang="en-US"/>
           </a:p>
@@ -2506,7 +2508,7 @@
           <a:p>
             <a:fld id="{9FCDD19A-6126-4CEB-B614-5FEAC3CD8997}" type="datetimeFigureOut">
               <a:rPr lang="en-US" smtClean="0"/>
-              <a:t>4/27/2019</a:t>
+              <a:t>4/28/2019</a:t>
             </a:fld>
             <a:endParaRPr lang="en-US"/>
           </a:p>
@@ -2803,7 +2805,7 @@
           <a:p>
             <a:fld id="{9FCDD19A-6126-4CEB-B614-5FEAC3CD8997}" type="datetimeFigureOut">
               <a:rPr lang="en-US" smtClean="0"/>
-              <a:t>4/27/2019</a:t>
+              <a:t>4/28/2019</a:t>
             </a:fld>
             <a:endParaRPr lang="en-US"/>
           </a:p>
@@ -2977,7 +2979,7 @@
           <a:p>
             <a:fld id="{9FCDD19A-6126-4CEB-B614-5FEAC3CD8997}" type="datetimeFigureOut">
               <a:rPr lang="en-US" smtClean="0"/>
-              <a:t>4/27/2019</a:t>
+              <a:t>4/28/2019</a:t>
             </a:fld>
             <a:endParaRPr lang="en-US"/>
           </a:p>
@@ -3157,7 +3159,7 @@
           <a:p>
             <a:fld id="{9FCDD19A-6126-4CEB-B614-5FEAC3CD8997}" type="datetimeFigureOut">
               <a:rPr lang="en-US" smtClean="0"/>
-              <a:t>4/27/2019</a:t>
+              <a:t>4/28/2019</a:t>
             </a:fld>
             <a:endParaRPr lang="en-US"/>
           </a:p>
@@ -3332,7 +3334,7 @@
           <a:p>
             <a:fld id="{9FCDD19A-6126-4CEB-B614-5FEAC3CD8997}" type="datetimeFigureOut">
               <a:rPr lang="en-US" smtClean="0"/>
-              <a:t>4/27/2019</a:t>
+              <a:t>4/28/2019</a:t>
             </a:fld>
             <a:endParaRPr lang="en-US"/>
           </a:p>
@@ -3583,7 +3585,7 @@
           <a:p>
             <a:fld id="{9FCDD19A-6126-4CEB-B614-5FEAC3CD8997}" type="datetimeFigureOut">
               <a:rPr lang="en-US" smtClean="0"/>
-              <a:t>4/27/2019</a:t>
+              <a:t>4/28/2019</a:t>
             </a:fld>
             <a:endParaRPr lang="en-US"/>
           </a:p>
@@ -3885,7 +3887,7 @@
           <a:p>
             <a:fld id="{9FCDD19A-6126-4CEB-B614-5FEAC3CD8997}" type="datetimeFigureOut">
               <a:rPr lang="en-US" smtClean="0"/>
-              <a:t>4/27/2019</a:t>
+              <a:t>4/28/2019</a:t>
             </a:fld>
             <a:endParaRPr lang="en-US"/>
           </a:p>
@@ -4327,7 +4329,7 @@
           <a:p>
             <a:fld id="{9FCDD19A-6126-4CEB-B614-5FEAC3CD8997}" type="datetimeFigureOut">
               <a:rPr lang="en-US" smtClean="0"/>
-              <a:t>4/27/2019</a:t>
+              <a:t>4/28/2019</a:t>
             </a:fld>
             <a:endParaRPr lang="en-US"/>
           </a:p>
@@ -4445,7 +4447,7 @@
           <a:p>
             <a:fld id="{9FCDD19A-6126-4CEB-B614-5FEAC3CD8997}" type="datetimeFigureOut">
               <a:rPr lang="en-US" smtClean="0"/>
-              <a:t>4/27/2019</a:t>
+              <a:t>4/28/2019</a:t>
             </a:fld>
             <a:endParaRPr lang="en-US"/>
           </a:p>
@@ -4540,7 +4542,7 @@
           <a:p>
             <a:fld id="{9FCDD19A-6126-4CEB-B614-5FEAC3CD8997}" type="datetimeFigureOut">
               <a:rPr lang="en-US" smtClean="0"/>
-              <a:t>4/27/2019</a:t>
+              <a:t>4/28/2019</a:t>
             </a:fld>
             <a:endParaRPr lang="en-US"/>
           </a:p>
@@ -4823,7 +4825,7 @@
           <a:p>
             <a:fld id="{9FCDD19A-6126-4CEB-B614-5FEAC3CD8997}" type="datetimeFigureOut">
               <a:rPr lang="en-US" smtClean="0"/>
-              <a:t>4/27/2019</a:t>
+              <a:t>4/28/2019</a:t>
             </a:fld>
             <a:endParaRPr lang="en-US"/>
           </a:p>
@@ -5114,7 +5116,7 @@
           <a:p>
             <a:fld id="{9FCDD19A-6126-4CEB-B614-5FEAC3CD8997}" type="datetimeFigureOut">
               <a:rPr lang="en-US" smtClean="0"/>
-              <a:t>4/27/2019</a:t>
+              <a:t>4/28/2019</a:t>
             </a:fld>
             <a:endParaRPr lang="en-US"/>
           </a:p>
@@ -5644,7 +5646,7 @@
           <a:p>
             <a:fld id="{9FCDD19A-6126-4CEB-B614-5FEAC3CD8997}" type="datetimeFigureOut">
               <a:rPr lang="en-US" smtClean="0"/>
-              <a:t>4/27/2019</a:t>
+              <a:t>4/28/2019</a:t>
             </a:fld>
             <a:endParaRPr lang="en-US"/>
           </a:p>
@@ -6541,7 +6543,7 @@
         <p:spPr>
           <a:xfrm>
             <a:off x="3483427" y="2650434"/>
-            <a:ext cx="1907682" cy="3032815"/>
+            <a:ext cx="1907682" cy="3293166"/>
           </a:xfrm>
           <a:prstGeom prst="rect">
             <a:avLst/>
@@ -6687,6 +6689,229 @@
               <a:srgbClr val="C0C0C0"/>
             </a:contourClr>
           </a:sp3d>
+        </p:spPr>
+      </p:pic>
+      <p:pic>
+        <p:nvPicPr>
+          <p:cNvPr id="3" name="Picture 2">
+            <a:extLst>
+              <a:ext uri="{FF2B5EF4-FFF2-40B4-BE49-F238E27FC236}">
+                <a16:creationId xmlns:a16="http://schemas.microsoft.com/office/drawing/2014/main" id="{32BB072A-EAB1-45A1-904D-25A5CFCC13E4}"/>
+              </a:ext>
+            </a:extLst>
+          </p:cNvPr>
+          <p:cNvPicPr>
+            <a:picLocks noChangeAspect="1"/>
+          </p:cNvPicPr>
+          <p:nvPr/>
+        </p:nvPicPr>
+        <p:blipFill>
+          <a:blip r:embed="rId7"/>
+          <a:stretch>
+            <a:fillRect/>
+          </a:stretch>
+        </p:blipFill>
+        <p:spPr>
+          <a:xfrm>
+            <a:off x="6478058" y="954157"/>
+            <a:ext cx="3858638" cy="2378280"/>
+          </a:xfrm>
+          <a:prstGeom prst="rect">
+            <a:avLst/>
+          </a:prstGeom>
+        </p:spPr>
+      </p:pic>
+      <p:pic>
+        <p:nvPicPr>
+          <p:cNvPr id="12" name="Picture 11">
+            <a:extLst>
+              <a:ext uri="{FF2B5EF4-FFF2-40B4-BE49-F238E27FC236}">
+                <a16:creationId xmlns:a16="http://schemas.microsoft.com/office/drawing/2014/main" id="{988AD1D8-E907-482D-A64A-73B7062D1645}"/>
+              </a:ext>
+            </a:extLst>
+          </p:cNvPr>
+          <p:cNvPicPr>
+            <a:picLocks noChangeAspect="1"/>
+          </p:cNvPicPr>
+          <p:nvPr/>
+        </p:nvPicPr>
+        <p:blipFill>
+          <a:blip r:embed="rId7"/>
+          <a:stretch>
+            <a:fillRect/>
+          </a:stretch>
+        </p:blipFill>
+        <p:spPr>
+          <a:xfrm>
+            <a:off x="3461790" y="2641989"/>
+            <a:ext cx="1921666" cy="1184423"/>
+          </a:xfrm>
+          <a:prstGeom prst="rect">
+            <a:avLst/>
+          </a:prstGeom>
+        </p:spPr>
+      </p:pic>
+      <p:pic>
+        <p:nvPicPr>
+          <p:cNvPr id="4" name="Picture 3">
+            <a:extLst>
+              <a:ext uri="{FF2B5EF4-FFF2-40B4-BE49-F238E27FC236}">
+                <a16:creationId xmlns:a16="http://schemas.microsoft.com/office/drawing/2014/main" id="{8AF8EF2D-B896-47D3-A281-55F3BD71BEB6}"/>
+              </a:ext>
+            </a:extLst>
+          </p:cNvPr>
+          <p:cNvPicPr>
+            <a:picLocks noChangeAspect="1"/>
+          </p:cNvPicPr>
+          <p:nvPr/>
+        </p:nvPicPr>
+        <p:blipFill rotWithShape="1">
+          <a:blip r:embed="rId8"/>
+          <a:srcRect t="1136" r="-77" b="-1"/>
+          <a:stretch/>
+        </p:blipFill>
+        <p:spPr>
+          <a:xfrm>
+            <a:off x="6474853" y="3419475"/>
+            <a:ext cx="3877551" cy="2308223"/>
+          </a:xfrm>
+          <a:prstGeom prst="rect">
+            <a:avLst/>
+          </a:prstGeom>
+        </p:spPr>
+      </p:pic>
+      <p:sp>
+        <p:nvSpPr>
+          <p:cNvPr id="6" name="Rectangle 5">
+            <a:extLst>
+              <a:ext uri="{FF2B5EF4-FFF2-40B4-BE49-F238E27FC236}">
+                <a16:creationId xmlns:a16="http://schemas.microsoft.com/office/drawing/2014/main" id="{191C0288-1754-46E1-A10F-D275603BEF13}"/>
+              </a:ext>
+            </a:extLst>
+          </p:cNvPr>
+          <p:cNvSpPr/>
+          <p:nvPr/>
+        </p:nvSpPr>
+        <p:spPr>
+          <a:xfrm>
+            <a:off x="7737475" y="3419475"/>
+            <a:ext cx="53975" cy="2308223"/>
+          </a:xfrm>
+          <a:prstGeom prst="rect">
+            <a:avLst/>
+          </a:prstGeom>
+          <a:solidFill>
+            <a:schemeClr val="bg1"/>
+          </a:solidFill>
+          <a:ln>
+            <a:noFill/>
+          </a:ln>
+        </p:spPr>
+        <p:style>
+          <a:lnRef idx="2">
+            <a:schemeClr val="accent1">
+              <a:shade val="50000"/>
+            </a:schemeClr>
+          </a:lnRef>
+          <a:fillRef idx="1">
+            <a:schemeClr val="accent1"/>
+          </a:fillRef>
+          <a:effectRef idx="0">
+            <a:schemeClr val="accent1"/>
+          </a:effectRef>
+          <a:fontRef idx="minor">
+            <a:schemeClr val="lt1"/>
+          </a:fontRef>
+        </p:style>
+        <p:txBody>
+          <a:bodyPr rtlCol="0" anchor="ctr"/>
+          <a:lstStyle/>
+          <a:p>
+            <a:pPr algn="ctr"/>
+            <a:endParaRPr lang="en-US"/>
+          </a:p>
+        </p:txBody>
+      </p:sp>
+      <p:sp>
+        <p:nvSpPr>
+          <p:cNvPr id="13" name="Rectangle 12">
+            <a:extLst>
+              <a:ext uri="{FF2B5EF4-FFF2-40B4-BE49-F238E27FC236}">
+                <a16:creationId xmlns:a16="http://schemas.microsoft.com/office/drawing/2014/main" id="{F1F5B573-5296-402C-9B09-6760B7B09863}"/>
+              </a:ext>
+            </a:extLst>
+          </p:cNvPr>
+          <p:cNvSpPr/>
+          <p:nvPr/>
+        </p:nvSpPr>
+        <p:spPr>
+          <a:xfrm>
+            <a:off x="9229725" y="3429000"/>
+            <a:ext cx="53975" cy="2308223"/>
+          </a:xfrm>
+          <a:prstGeom prst="rect">
+            <a:avLst/>
+          </a:prstGeom>
+          <a:solidFill>
+            <a:schemeClr val="bg1"/>
+          </a:solidFill>
+          <a:ln>
+            <a:noFill/>
+          </a:ln>
+        </p:spPr>
+        <p:style>
+          <a:lnRef idx="2">
+            <a:schemeClr val="accent1">
+              <a:shade val="50000"/>
+            </a:schemeClr>
+          </a:lnRef>
+          <a:fillRef idx="1">
+            <a:schemeClr val="accent1"/>
+          </a:fillRef>
+          <a:effectRef idx="0">
+            <a:schemeClr val="accent1"/>
+          </a:effectRef>
+          <a:fontRef idx="minor">
+            <a:schemeClr val="lt1"/>
+          </a:fontRef>
+        </p:style>
+        <p:txBody>
+          <a:bodyPr rtlCol="0" anchor="ctr"/>
+          <a:lstStyle/>
+          <a:p>
+            <a:pPr algn="ctr"/>
+            <a:endParaRPr lang="en-US"/>
+          </a:p>
+        </p:txBody>
+      </p:sp>
+      <p:pic>
+        <p:nvPicPr>
+          <p:cNvPr id="8" name="Picture 7">
+            <a:extLst>
+              <a:ext uri="{FF2B5EF4-FFF2-40B4-BE49-F238E27FC236}">
+                <a16:creationId xmlns:a16="http://schemas.microsoft.com/office/drawing/2014/main" id="{F9945803-810F-4DAD-9C5C-3ADCE69E2EE1}"/>
+              </a:ext>
+            </a:extLst>
+          </p:cNvPr>
+          <p:cNvPicPr>
+            <a:picLocks noChangeAspect="1"/>
+          </p:cNvPicPr>
+          <p:nvPr/>
+        </p:nvPicPr>
+        <p:blipFill>
+          <a:blip r:embed="rId9"/>
+          <a:stretch>
+            <a:fillRect/>
+          </a:stretch>
+        </p:blipFill>
+        <p:spPr>
+          <a:xfrm>
+            <a:off x="3557412" y="3767916"/>
+            <a:ext cx="1757537" cy="2184129"/>
+          </a:xfrm>
+          <a:prstGeom prst="rect">
+            <a:avLst/>
+          </a:prstGeom>
         </p:spPr>
       </p:pic>
     </p:spTree>
@@ -6719,45 +6944,12 @@
           <a:chExt cx="0" cy="0"/>
         </a:xfrm>
       </p:grpSpPr>
-      <p:sp>
-        <p:nvSpPr>
-          <p:cNvPr id="2" name="Title 1">
+      <p:pic>
+        <p:nvPicPr>
+          <p:cNvPr id="7" name="Picture 6">
             <a:extLst>
               <a:ext uri="{FF2B5EF4-FFF2-40B4-BE49-F238E27FC236}">
-                <a16:creationId xmlns:a16="http://schemas.microsoft.com/office/drawing/2014/main" id="{B8B7243F-0E6B-4F9A-861E-2C6E97A8F5BF}"/>
-              </a:ext>
-            </a:extLst>
-          </p:cNvPr>
-          <p:cNvSpPr>
-            <a:spLocks noGrp="1"/>
-          </p:cNvSpPr>
-          <p:nvPr>
-            <p:ph type="title"/>
-          </p:nvPr>
-        </p:nvSpPr>
-        <p:spPr>
-          <a:xfrm>
-            <a:off x="1484309" y="0"/>
-            <a:ext cx="10018713" cy="1752599"/>
-          </a:xfrm>
-        </p:spPr>
-        <p:txBody>
-          <a:bodyPr/>
-          <a:lstStyle/>
-          <a:p>
-            <a:r>
-              <a:rPr lang="en-US" dirty="0"/>
-              <a:t>MIT License </a:t>
-            </a:r>
-          </a:p>
-        </p:txBody>
-      </p:sp>
-      <p:pic>
-        <p:nvPicPr>
-          <p:cNvPr id="4" name="Picture 3">
-            <a:extLst>
-              <a:ext uri="{FF2B5EF4-FFF2-40B4-BE49-F238E27FC236}">
-                <a16:creationId xmlns:a16="http://schemas.microsoft.com/office/drawing/2014/main" id="{E230ADB6-386C-441B-BB18-28CA4F93E331}"/>
+                <a16:creationId xmlns:a16="http://schemas.microsoft.com/office/drawing/2014/main" id="{8F5BC90F-73D6-416F-BF62-D97D7D0FDCA9}"/>
               </a:ext>
             </a:extLst>
           </p:cNvPr>
@@ -6767,25 +6959,602 @@
           <p:nvPr/>
         </p:nvPicPr>
         <p:blipFill>
-          <a:blip r:embed="rId2"/>
+          <a:blip r:embed="rId2">
+            <a:extLst>
+              <a:ext uri="{BEBA8EAE-BF5A-486C-A8C5-ECC9F3942E4B}">
+                <a14:imgProps xmlns:a14="http://schemas.microsoft.com/office/drawing/2010/main">
+                  <a14:imgLayer r:embed="rId3">
+                    <a14:imgEffect>
+                      <a14:backgroundRemoval t="2685" b="96309" l="6509" r="92308">
+                        <a14:foregroundMark x1="8284" y1="12752" x2="14793" y2="4362"/>
+                        <a14:foregroundMark x1="14793" y1="4362" x2="28994" y2="1007"/>
+                        <a14:foregroundMark x1="28994" y1="1007" x2="44970" y2="4027"/>
+                        <a14:foregroundMark x1="44970" y1="4027" x2="60947" y2="2013"/>
+                        <a14:foregroundMark x1="60947" y1="2013" x2="75148" y2="4698"/>
+                        <a14:foregroundMark x1="75148" y1="4698" x2="78698" y2="3691"/>
+                        <a14:foregroundMark x1="90533" y1="9060" x2="90533" y2="14094"/>
+                        <a14:foregroundMark x1="92308" y1="24497" x2="90533" y2="18121"/>
+                        <a14:foregroundMark x1="91716" y1="39597" x2="92308" y2="25503"/>
+                        <a14:foregroundMark x1="91716" y1="52349" x2="92899" y2="40268"/>
+                        <a14:foregroundMark x1="91716" y1="66107" x2="92308" y2="54362"/>
+                        <a14:foregroundMark x1="90533" y1="66107" x2="86982" y2="90940"/>
+                        <a14:foregroundMark x1="89941" y1="91611" x2="73964" y2="96309"/>
+                        <a14:foregroundMark x1="73964" y1="96309" x2="46154" y2="99329"/>
+                        <a14:foregroundMark x1="46154" y1="99329" x2="30178" y2="94295"/>
+                        <a14:foregroundMark x1="30178" y1="94295" x2="21893" y2="89597"/>
+                        <a14:foregroundMark x1="70414" y1="94631" x2="48521" y2="92617"/>
+                        <a14:foregroundMark x1="48521" y1="92617" x2="37278" y2="85570"/>
+                        <a14:foregroundMark x1="37278" y1="85570" x2="36686" y2="85235"/>
+                        <a14:foregroundMark x1="28994" y1="89262" x2="16568" y2="83221"/>
+                        <a14:foregroundMark x1="16568" y1="83221" x2="15976" y2="81544"/>
+                        <a14:foregroundMark x1="31953" y1="96644" x2="17160" y2="92953"/>
+                        <a14:foregroundMark x1="17160" y1="92953" x2="13018" y2="84564"/>
+                        <a14:foregroundMark x1="13018" y1="84564" x2="13609" y2="79530"/>
+                        <a14:foregroundMark x1="10651" y1="85570" x2="7692" y2="76510"/>
+                        <a14:foregroundMark x1="7692" y1="76510" x2="10059" y2="17785"/>
+                        <a14:foregroundMark x1="7692" y1="31208" x2="7101" y2="21141"/>
+                        <a14:foregroundMark x1="6509" y1="20805" x2="8284" y2="21141"/>
+                        <a14:foregroundMark x1="92308" y1="19463" x2="92308" y2="11409"/>
+                        <a14:foregroundMark x1="8284" y1="4362" x2="10059" y2="2685"/>
+                        <a14:foregroundMark x1="7692" y1="15436" x2="8876" y2="11074"/>
+                      </a14:backgroundRemoval>
+                    </a14:imgEffect>
+                  </a14:imgLayer>
+                </a14:imgProps>
+              </a:ext>
+            </a:extLst>
+          </a:blip>
           <a:stretch>
             <a:fillRect/>
           </a:stretch>
         </p:blipFill>
         <p:spPr>
           <a:xfrm>
-            <a:off x="2092292" y="1370735"/>
-            <a:ext cx="8802746" cy="4869604"/>
+            <a:off x="3204019" y="2151742"/>
+            <a:ext cx="2453833" cy="4326877"/>
           </a:xfrm>
           <a:prstGeom prst="rect">
             <a:avLst/>
           </a:prstGeom>
         </p:spPr>
       </p:pic>
+      <p:pic>
+        <p:nvPicPr>
+          <p:cNvPr id="9" name="Picture 8">
+            <a:extLst>
+              <a:ext uri="{FF2B5EF4-FFF2-40B4-BE49-F238E27FC236}">
+                <a16:creationId xmlns:a16="http://schemas.microsoft.com/office/drawing/2014/main" id="{1AB7AAF8-CBAE-44A4-BE02-45CC75D56314}"/>
+              </a:ext>
+            </a:extLst>
+          </p:cNvPr>
+          <p:cNvPicPr>
+            <a:picLocks noChangeAspect="1"/>
+          </p:cNvPicPr>
+          <p:nvPr/>
+        </p:nvPicPr>
+        <p:blipFill rotWithShape="1">
+          <a:blip r:embed="rId4">
+            <a:extLst>
+              <a:ext uri="{BEBA8EAE-BF5A-486C-A8C5-ECC9F3942E4B}">
+                <a14:imgProps xmlns:a14="http://schemas.microsoft.com/office/drawing/2010/main">
+                  <a14:imgLayer r:embed="rId5">
+                    <a14:imgEffect>
+                      <a14:backgroundRemoval t="4305" b="94702" l="10000" r="90000">
+                        <a14:foregroundMark x1="74000" y1="55960" x2="73750" y2="38742"/>
+                        <a14:foregroundMark x1="73750" y1="38742" x2="72000" y2="29801"/>
+                        <a14:foregroundMark x1="72000" y1="29801" x2="73000" y2="5629"/>
+                        <a14:foregroundMark x1="26750" y1="9272" x2="33250" y2="4305"/>
+                        <a14:foregroundMark x1="33250" y1="4305" x2="51500" y2="5629"/>
+                        <a14:foregroundMark x1="51500" y1="5629" x2="63000" y2="5298"/>
+                        <a14:foregroundMark x1="63000" y1="5298" x2="66750" y2="6291"/>
+                        <a14:foregroundMark x1="74500" y1="5298" x2="74500" y2="37417"/>
+                        <a14:foregroundMark x1="74000" y1="53642" x2="73750" y2="69205"/>
+                        <a14:foregroundMark x1="73750" y1="69205" x2="71750" y2="77815"/>
+                        <a14:foregroundMark x1="71750" y1="77815" x2="73500" y2="85099"/>
+                        <a14:foregroundMark x1="73500" y1="85099" x2="73750" y2="93377"/>
+                        <a14:foregroundMark x1="73750" y1="93377" x2="68250" y2="97682"/>
+                        <a14:foregroundMark x1="68250" y1="97682" x2="61250" y2="99669"/>
+                        <a14:foregroundMark x1="61250" y1="99669" x2="48750" y2="95364"/>
+                        <a14:foregroundMark x1="48750" y1="95364" x2="29250" y2="95695"/>
+                        <a14:foregroundMark x1="29250" y1="95695" x2="24750" y2="90397"/>
+                        <a14:foregroundMark x1="24750" y1="90397" x2="24750" y2="82781"/>
+                        <a14:foregroundMark x1="24750" y1="82781" x2="27000" y2="75166"/>
+                        <a14:foregroundMark x1="27000" y1="75166" x2="26750" y2="20199"/>
+                        <a14:foregroundMark x1="25250" y1="47351" x2="25250" y2="77483"/>
+                        <a14:foregroundMark x1="71750" y1="94040" x2="46500" y2="94702"/>
+                      </a14:backgroundRemoval>
+                    </a14:imgEffect>
+                  </a14:imgLayer>
+                </a14:imgProps>
+              </a:ext>
+            </a:extLst>
+          </a:blip>
+          <a:srcRect l="22629" r="21686"/>
+          <a:stretch/>
+        </p:blipFill>
+        <p:spPr>
+          <a:xfrm>
+            <a:off x="6095999" y="99981"/>
+            <a:ext cx="4704523" cy="6378638"/>
+          </a:xfrm>
+          <a:prstGeom prst="rect">
+            <a:avLst/>
+          </a:prstGeom>
+        </p:spPr>
+      </p:pic>
+      <p:sp>
+        <p:nvSpPr>
+          <p:cNvPr id="10" name="Rectangle 9">
+            <a:extLst>
+              <a:ext uri="{FF2B5EF4-FFF2-40B4-BE49-F238E27FC236}">
+                <a16:creationId xmlns:a16="http://schemas.microsoft.com/office/drawing/2014/main" id="{FC6EC4A3-E8AC-4D54-B331-82BD3A51D977}"/>
+              </a:ext>
+            </a:extLst>
+          </p:cNvPr>
+          <p:cNvSpPr/>
+          <p:nvPr/>
+        </p:nvSpPr>
+        <p:spPr>
+          <a:xfrm>
+            <a:off x="3483427" y="2650434"/>
+            <a:ext cx="1907682" cy="3293166"/>
+          </a:xfrm>
+          <a:prstGeom prst="rect">
+            <a:avLst/>
+          </a:prstGeom>
+          <a:solidFill>
+            <a:schemeClr val="bg1"/>
+          </a:solidFill>
+          <a:ln>
+            <a:solidFill>
+              <a:schemeClr val="bg1"/>
+            </a:solidFill>
+          </a:ln>
+        </p:spPr>
+        <p:style>
+          <a:lnRef idx="2">
+            <a:schemeClr val="accent1">
+              <a:shade val="50000"/>
+            </a:schemeClr>
+          </a:lnRef>
+          <a:fillRef idx="1">
+            <a:schemeClr val="accent1"/>
+          </a:fillRef>
+          <a:effectRef idx="0">
+            <a:schemeClr val="accent1"/>
+          </a:effectRef>
+          <a:fontRef idx="minor">
+            <a:schemeClr val="lt1"/>
+          </a:fontRef>
+        </p:style>
+        <p:txBody>
+          <a:bodyPr rtlCol="0" anchor="ctr"/>
+          <a:lstStyle/>
+          <a:p>
+            <a:pPr algn="ctr"/>
+            <a:endParaRPr lang="en-US"/>
+          </a:p>
+        </p:txBody>
+      </p:sp>
+      <p:sp>
+        <p:nvSpPr>
+          <p:cNvPr id="11" name="Rectangle 10">
+            <a:extLst>
+              <a:ext uri="{FF2B5EF4-FFF2-40B4-BE49-F238E27FC236}">
+                <a16:creationId xmlns:a16="http://schemas.microsoft.com/office/drawing/2014/main" id="{2E32BB29-F44D-482C-B8E0-C3D3F7C67639}"/>
+              </a:ext>
+            </a:extLst>
+          </p:cNvPr>
+          <p:cNvSpPr/>
+          <p:nvPr/>
+        </p:nvSpPr>
+        <p:spPr>
+          <a:xfrm>
+            <a:off x="6478058" y="954157"/>
+            <a:ext cx="3858638" cy="4943060"/>
+          </a:xfrm>
+          <a:prstGeom prst="rect">
+            <a:avLst/>
+          </a:prstGeom>
+          <a:solidFill>
+            <a:schemeClr val="bg1"/>
+          </a:solidFill>
+          <a:ln>
+            <a:solidFill>
+              <a:schemeClr val="bg1"/>
+            </a:solidFill>
+          </a:ln>
+        </p:spPr>
+        <p:style>
+          <a:lnRef idx="2">
+            <a:schemeClr val="accent1">
+              <a:shade val="50000"/>
+            </a:schemeClr>
+          </a:lnRef>
+          <a:fillRef idx="1">
+            <a:schemeClr val="accent1"/>
+          </a:fillRef>
+          <a:effectRef idx="0">
+            <a:schemeClr val="accent1"/>
+          </a:effectRef>
+          <a:fontRef idx="minor">
+            <a:schemeClr val="lt1"/>
+          </a:fontRef>
+        </p:style>
+        <p:txBody>
+          <a:bodyPr rtlCol="0" anchor="ctr"/>
+          <a:lstStyle/>
+          <a:p>
+            <a:pPr algn="ctr"/>
+            <a:endParaRPr lang="en-US"/>
+          </a:p>
+        </p:txBody>
+      </p:sp>
+      <p:pic>
+        <p:nvPicPr>
+          <p:cNvPr id="18" name="Picture 17">
+            <a:extLst>
+              <a:ext uri="{FF2B5EF4-FFF2-40B4-BE49-F238E27FC236}">
+                <a16:creationId xmlns:a16="http://schemas.microsoft.com/office/drawing/2014/main" id="{5E96A8B7-FCA6-4CE4-B287-7A8DAFEF7DF9}"/>
+              </a:ext>
+            </a:extLst>
+          </p:cNvPr>
+          <p:cNvPicPr>
+            <a:picLocks noChangeAspect="1"/>
+          </p:cNvPicPr>
+          <p:nvPr/>
+        </p:nvPicPr>
+        <p:blipFill rotWithShape="1">
+          <a:blip r:embed="rId6"/>
+          <a:srcRect l="3537" r="8757"/>
+          <a:stretch/>
+        </p:blipFill>
+        <p:spPr>
+          <a:xfrm>
+            <a:off x="1458847" y="3937289"/>
+            <a:ext cx="1330760" cy="1239223"/>
+          </a:xfrm>
+          <a:prstGeom prst="roundRect">
+            <a:avLst>
+              <a:gd name="adj" fmla="val 13166"/>
+            </a:avLst>
+          </a:prstGeom>
+          <a:solidFill>
+            <a:srgbClr val="FFFFFF"/>
+          </a:solidFill>
+          <a:ln w="76200" cap="sq">
+            <a:solidFill>
+              <a:srgbClr val="292929"/>
+            </a:solidFill>
+            <a:miter lim="800000"/>
+          </a:ln>
+          <a:effectLst>
+            <a:reflection blurRad="12700" stA="28000" endPos="28000" dist="5000" dir="5400000" sy="-100000" algn="bl" rotWithShape="0"/>
+          </a:effectLst>
+          <a:scene3d>
+            <a:camera prst="orthographicFront"/>
+            <a:lightRig rig="threePt" dir="t">
+              <a:rot lat="0" lon="0" rev="2700000"/>
+            </a:lightRig>
+          </a:scene3d>
+          <a:sp3d>
+            <a:bevelT h="38100"/>
+            <a:contourClr>
+              <a:srgbClr val="C0C0C0"/>
+            </a:contourClr>
+          </a:sp3d>
+        </p:spPr>
+      </p:pic>
+      <p:pic>
+        <p:nvPicPr>
+          <p:cNvPr id="3" name="Picture 2">
+            <a:extLst>
+              <a:ext uri="{FF2B5EF4-FFF2-40B4-BE49-F238E27FC236}">
+                <a16:creationId xmlns:a16="http://schemas.microsoft.com/office/drawing/2014/main" id="{32BB072A-EAB1-45A1-904D-25A5CFCC13E4}"/>
+              </a:ext>
+            </a:extLst>
+          </p:cNvPr>
+          <p:cNvPicPr>
+            <a:picLocks noChangeAspect="1"/>
+          </p:cNvPicPr>
+          <p:nvPr/>
+        </p:nvPicPr>
+        <p:blipFill>
+          <a:blip r:embed="rId7"/>
+          <a:stretch>
+            <a:fillRect/>
+          </a:stretch>
+        </p:blipFill>
+        <p:spPr>
+          <a:xfrm>
+            <a:off x="6478058" y="954157"/>
+            <a:ext cx="3858638" cy="2378280"/>
+          </a:xfrm>
+          <a:prstGeom prst="rect">
+            <a:avLst/>
+          </a:prstGeom>
+        </p:spPr>
+      </p:pic>
+      <p:pic>
+        <p:nvPicPr>
+          <p:cNvPr id="12" name="Picture 11">
+            <a:extLst>
+              <a:ext uri="{FF2B5EF4-FFF2-40B4-BE49-F238E27FC236}">
+                <a16:creationId xmlns:a16="http://schemas.microsoft.com/office/drawing/2014/main" id="{988AD1D8-E907-482D-A64A-73B7062D1645}"/>
+              </a:ext>
+            </a:extLst>
+          </p:cNvPr>
+          <p:cNvPicPr>
+            <a:picLocks noChangeAspect="1"/>
+          </p:cNvPicPr>
+          <p:nvPr/>
+        </p:nvPicPr>
+        <p:blipFill>
+          <a:blip r:embed="rId7"/>
+          <a:stretch>
+            <a:fillRect/>
+          </a:stretch>
+        </p:blipFill>
+        <p:spPr>
+          <a:xfrm>
+            <a:off x="3461790" y="2641989"/>
+            <a:ext cx="1921666" cy="1184423"/>
+          </a:xfrm>
+          <a:prstGeom prst="rect">
+            <a:avLst/>
+          </a:prstGeom>
+        </p:spPr>
+      </p:pic>
+      <p:pic>
+        <p:nvPicPr>
+          <p:cNvPr id="4" name="Picture 3">
+            <a:extLst>
+              <a:ext uri="{FF2B5EF4-FFF2-40B4-BE49-F238E27FC236}">
+                <a16:creationId xmlns:a16="http://schemas.microsoft.com/office/drawing/2014/main" id="{8AF8EF2D-B896-47D3-A281-55F3BD71BEB6}"/>
+              </a:ext>
+            </a:extLst>
+          </p:cNvPr>
+          <p:cNvPicPr>
+            <a:picLocks noChangeAspect="1"/>
+          </p:cNvPicPr>
+          <p:nvPr/>
+        </p:nvPicPr>
+        <p:blipFill rotWithShape="1">
+          <a:blip r:embed="rId8"/>
+          <a:srcRect t="1136" r="-77" b="-1"/>
+          <a:stretch/>
+        </p:blipFill>
+        <p:spPr>
+          <a:xfrm>
+            <a:off x="6474853" y="3419475"/>
+            <a:ext cx="3877551" cy="2308223"/>
+          </a:xfrm>
+          <a:prstGeom prst="rect">
+            <a:avLst/>
+          </a:prstGeom>
+        </p:spPr>
+      </p:pic>
+      <p:sp>
+        <p:nvSpPr>
+          <p:cNvPr id="6" name="Rectangle 5">
+            <a:extLst>
+              <a:ext uri="{FF2B5EF4-FFF2-40B4-BE49-F238E27FC236}">
+                <a16:creationId xmlns:a16="http://schemas.microsoft.com/office/drawing/2014/main" id="{191C0288-1754-46E1-A10F-D275603BEF13}"/>
+              </a:ext>
+            </a:extLst>
+          </p:cNvPr>
+          <p:cNvSpPr/>
+          <p:nvPr/>
+        </p:nvSpPr>
+        <p:spPr>
+          <a:xfrm>
+            <a:off x="7737475" y="3419475"/>
+            <a:ext cx="53975" cy="2308223"/>
+          </a:xfrm>
+          <a:prstGeom prst="rect">
+            <a:avLst/>
+          </a:prstGeom>
+          <a:solidFill>
+            <a:schemeClr val="bg1"/>
+          </a:solidFill>
+          <a:ln>
+            <a:noFill/>
+          </a:ln>
+        </p:spPr>
+        <p:style>
+          <a:lnRef idx="2">
+            <a:schemeClr val="accent1">
+              <a:shade val="50000"/>
+            </a:schemeClr>
+          </a:lnRef>
+          <a:fillRef idx="1">
+            <a:schemeClr val="accent1"/>
+          </a:fillRef>
+          <a:effectRef idx="0">
+            <a:schemeClr val="accent1"/>
+          </a:effectRef>
+          <a:fontRef idx="minor">
+            <a:schemeClr val="lt1"/>
+          </a:fontRef>
+        </p:style>
+        <p:txBody>
+          <a:bodyPr rtlCol="0" anchor="ctr"/>
+          <a:lstStyle/>
+          <a:p>
+            <a:pPr algn="ctr"/>
+            <a:endParaRPr lang="en-US"/>
+          </a:p>
+        </p:txBody>
+      </p:sp>
+      <p:sp>
+        <p:nvSpPr>
+          <p:cNvPr id="13" name="Rectangle 12">
+            <a:extLst>
+              <a:ext uri="{FF2B5EF4-FFF2-40B4-BE49-F238E27FC236}">
+                <a16:creationId xmlns:a16="http://schemas.microsoft.com/office/drawing/2014/main" id="{F1F5B573-5296-402C-9B09-6760B7B09863}"/>
+              </a:ext>
+            </a:extLst>
+          </p:cNvPr>
+          <p:cNvSpPr/>
+          <p:nvPr/>
+        </p:nvSpPr>
+        <p:spPr>
+          <a:xfrm>
+            <a:off x="9229725" y="3429000"/>
+            <a:ext cx="53975" cy="2308223"/>
+          </a:xfrm>
+          <a:prstGeom prst="rect">
+            <a:avLst/>
+          </a:prstGeom>
+          <a:solidFill>
+            <a:schemeClr val="bg1"/>
+          </a:solidFill>
+          <a:ln>
+            <a:noFill/>
+          </a:ln>
+        </p:spPr>
+        <p:style>
+          <a:lnRef idx="2">
+            <a:schemeClr val="accent1">
+              <a:shade val="50000"/>
+            </a:schemeClr>
+          </a:lnRef>
+          <a:fillRef idx="1">
+            <a:schemeClr val="accent1"/>
+          </a:fillRef>
+          <a:effectRef idx="0">
+            <a:schemeClr val="accent1"/>
+          </a:effectRef>
+          <a:fontRef idx="minor">
+            <a:schemeClr val="lt1"/>
+          </a:fontRef>
+        </p:style>
+        <p:txBody>
+          <a:bodyPr rtlCol="0" anchor="ctr"/>
+          <a:lstStyle/>
+          <a:p>
+            <a:pPr algn="ctr"/>
+            <a:endParaRPr lang="en-US"/>
+          </a:p>
+        </p:txBody>
+      </p:sp>
+      <p:pic>
+        <p:nvPicPr>
+          <p:cNvPr id="8" name="Picture 7">
+            <a:extLst>
+              <a:ext uri="{FF2B5EF4-FFF2-40B4-BE49-F238E27FC236}">
+                <a16:creationId xmlns:a16="http://schemas.microsoft.com/office/drawing/2014/main" id="{F9945803-810F-4DAD-9C5C-3ADCE69E2EE1}"/>
+              </a:ext>
+            </a:extLst>
+          </p:cNvPr>
+          <p:cNvPicPr>
+            <a:picLocks noChangeAspect="1"/>
+          </p:cNvPicPr>
+          <p:nvPr/>
+        </p:nvPicPr>
+        <p:blipFill>
+          <a:blip r:embed="rId9"/>
+          <a:stretch>
+            <a:fillRect/>
+          </a:stretch>
+        </p:blipFill>
+        <p:spPr>
+          <a:xfrm>
+            <a:off x="3557412" y="3767916"/>
+            <a:ext cx="1757537" cy="2184129"/>
+          </a:xfrm>
+          <a:prstGeom prst="rect">
+            <a:avLst/>
+          </a:prstGeom>
+        </p:spPr>
+      </p:pic>
+      <p:sp>
+        <p:nvSpPr>
+          <p:cNvPr id="14" name="Rectangle 13">
+            <a:extLst>
+              <a:ext uri="{FF2B5EF4-FFF2-40B4-BE49-F238E27FC236}">
+                <a16:creationId xmlns:a16="http://schemas.microsoft.com/office/drawing/2014/main" id="{32272B52-BA45-4EDC-A9CC-43223451535A}"/>
+              </a:ext>
+            </a:extLst>
+          </p:cNvPr>
+          <p:cNvSpPr/>
+          <p:nvPr/>
+        </p:nvSpPr>
+        <p:spPr>
+          <a:xfrm>
+            <a:off x="2237756" y="2821371"/>
+            <a:ext cx="7278339" cy="1569660"/>
+          </a:xfrm>
+          <a:prstGeom prst="rect">
+            <a:avLst/>
+          </a:prstGeom>
+          <a:noFill/>
+        </p:spPr>
+        <p:txBody>
+          <a:bodyPr wrap="none" lIns="91440" tIns="45720" rIns="91440" bIns="45720">
+            <a:spAutoFit/>
+          </a:bodyPr>
+          <a:lstStyle/>
+          <a:p>
+            <a:pPr algn="ctr"/>
+            <a:r>
+              <a:rPr lang="en-US" sz="9600" b="1" dirty="0">
+                <a:ln w="9525">
+                  <a:solidFill>
+                    <a:schemeClr val="bg1"/>
+                  </a:solidFill>
+                  <a:prstDash val="solid"/>
+                </a:ln>
+                <a:solidFill>
+                  <a:schemeClr val="accent5"/>
+                </a:solidFill>
+                <a:effectLst>
+                  <a:outerShdw blurRad="12700" dist="38100" dir="2700000" algn="tl" rotWithShape="0">
+                    <a:schemeClr val="accent5">
+                      <a:lumMod val="60000"/>
+                      <a:lumOff val="40000"/>
+                    </a:schemeClr>
+                  </a:outerShdw>
+                </a:effectLst>
+              </a:rPr>
+              <a:t>Coming Soon</a:t>
+            </a:r>
+            <a:endParaRPr lang="en-US" sz="9600" b="1" cap="none" spc="0" dirty="0">
+              <a:ln w="12700" cmpd="sng">
+                <a:solidFill>
+                  <a:schemeClr val="accent4"/>
+                </a:solidFill>
+                <a:prstDash val="solid"/>
+              </a:ln>
+              <a:gradFill>
+                <a:gsLst>
+                  <a:gs pos="0">
+                    <a:schemeClr val="accent4"/>
+                  </a:gs>
+                  <a:gs pos="4000">
+                    <a:schemeClr val="accent4">
+                      <a:lumMod val="60000"/>
+                      <a:lumOff val="40000"/>
+                    </a:schemeClr>
+                  </a:gs>
+                  <a:gs pos="87000">
+                    <a:schemeClr val="accent4">
+                      <a:lumMod val="20000"/>
+                      <a:lumOff val="80000"/>
+                    </a:schemeClr>
+                  </a:gs>
+                </a:gsLst>
+                <a:lin ang="5400000"/>
+              </a:gradFill>
+              <a:effectLst/>
+            </a:endParaRPr>
+          </a:p>
+        </p:txBody>
+      </p:sp>
     </p:spTree>
     <p:extLst>
       <p:ext uri="{BB962C8B-B14F-4D97-AF65-F5344CB8AC3E}">
-        <p14:creationId xmlns:p14="http://schemas.microsoft.com/office/powerpoint/2010/main" val="1520482395"/>
+        <p14:creationId xmlns:p14="http://schemas.microsoft.com/office/powerpoint/2010/main" val="35986702"/>
       </p:ext>
     </p:extLst>
   </p:cSld>
@@ -6817,6 +7586,99 @@
           <p:cNvPr id="2" name="Title 1">
             <a:extLst>
               <a:ext uri="{FF2B5EF4-FFF2-40B4-BE49-F238E27FC236}">
+                <a16:creationId xmlns:a16="http://schemas.microsoft.com/office/drawing/2014/main" id="{B8B7243F-0E6B-4F9A-861E-2C6E97A8F5BF}"/>
+              </a:ext>
+            </a:extLst>
+          </p:cNvPr>
+          <p:cNvSpPr>
+            <a:spLocks noGrp="1"/>
+          </p:cNvSpPr>
+          <p:nvPr>
+            <p:ph type="title"/>
+          </p:nvPr>
+        </p:nvSpPr>
+        <p:spPr>
+          <a:xfrm>
+            <a:off x="1484309" y="0"/>
+            <a:ext cx="10018713" cy="1752599"/>
+          </a:xfrm>
+        </p:spPr>
+        <p:txBody>
+          <a:bodyPr/>
+          <a:lstStyle/>
+          <a:p>
+            <a:r>
+              <a:rPr lang="en-US" dirty="0"/>
+              <a:t>MIT License </a:t>
+            </a:r>
+          </a:p>
+        </p:txBody>
+      </p:sp>
+      <p:pic>
+        <p:nvPicPr>
+          <p:cNvPr id="4" name="Picture 3">
+            <a:extLst>
+              <a:ext uri="{FF2B5EF4-FFF2-40B4-BE49-F238E27FC236}">
+                <a16:creationId xmlns:a16="http://schemas.microsoft.com/office/drawing/2014/main" id="{E230ADB6-386C-441B-BB18-28CA4F93E331}"/>
+              </a:ext>
+            </a:extLst>
+          </p:cNvPr>
+          <p:cNvPicPr>
+            <a:picLocks noChangeAspect="1"/>
+          </p:cNvPicPr>
+          <p:nvPr/>
+        </p:nvPicPr>
+        <p:blipFill>
+          <a:blip r:embed="rId2"/>
+          <a:stretch>
+            <a:fillRect/>
+          </a:stretch>
+        </p:blipFill>
+        <p:spPr>
+          <a:xfrm>
+            <a:off x="2092292" y="1370735"/>
+            <a:ext cx="8802746" cy="4869604"/>
+          </a:xfrm>
+          <a:prstGeom prst="rect">
+            <a:avLst/>
+          </a:prstGeom>
+        </p:spPr>
+      </p:pic>
+    </p:spTree>
+    <p:extLst>
+      <p:ext uri="{BB962C8B-B14F-4D97-AF65-F5344CB8AC3E}">
+        <p14:creationId xmlns:p14="http://schemas.microsoft.com/office/powerpoint/2010/main" val="1520482395"/>
+      </p:ext>
+    </p:extLst>
+  </p:cSld>
+  <p:clrMapOvr>
+    <a:masterClrMapping/>
+  </p:clrMapOvr>
+</p:sld>
+</file>
+
+<file path=ppt/slides/slide13.xml><?xml version="1.0" encoding="utf-8"?>
+<p:sld xmlns:a="http://schemas.openxmlformats.org/drawingml/2006/main" xmlns:r="http://schemas.openxmlformats.org/officeDocument/2006/relationships" xmlns:p="http://schemas.openxmlformats.org/presentationml/2006/main">
+  <p:cSld>
+    <p:spTree>
+      <p:nvGrpSpPr>
+        <p:cNvPr id="1" name=""/>
+        <p:cNvGrpSpPr/>
+        <p:nvPr/>
+      </p:nvGrpSpPr>
+      <p:grpSpPr>
+        <a:xfrm>
+          <a:off x="0" y="0"/>
+          <a:ext cx="0" cy="0"/>
+          <a:chOff x="0" y="0"/>
+          <a:chExt cx="0" cy="0"/>
+        </a:xfrm>
+      </p:grpSpPr>
+      <p:sp>
+        <p:nvSpPr>
+          <p:cNvPr id="2" name="Title 1">
+            <a:extLst>
+              <a:ext uri="{FF2B5EF4-FFF2-40B4-BE49-F238E27FC236}">
                 <a16:creationId xmlns:a16="http://schemas.microsoft.com/office/drawing/2014/main" id="{6EDDDBFE-F9A1-4F90-B18D-AB3C0CEBC11D}"/>
               </a:ext>
             </a:extLst>
@@ -7064,7 +7926,974 @@
 </p:sld>
 </file>
 
-<file path=ppt/slides/slide13.xml><?xml version="1.0" encoding="utf-8"?>
+<file path=ppt/slides/slide14.xml><?xml version="1.0" encoding="utf-8"?>
+<p:sld xmlns:a="http://schemas.openxmlformats.org/drawingml/2006/main" xmlns:r="http://schemas.openxmlformats.org/officeDocument/2006/relationships" xmlns:p="http://schemas.openxmlformats.org/presentationml/2006/main">
+  <p:cSld>
+    <p:spTree>
+      <p:nvGrpSpPr>
+        <p:cNvPr id="1" name=""/>
+        <p:cNvGrpSpPr/>
+        <p:nvPr/>
+      </p:nvGrpSpPr>
+      <p:grpSpPr>
+        <a:xfrm>
+          <a:off x="0" y="0"/>
+          <a:ext cx="0" cy="0"/>
+          <a:chOff x="0" y="0"/>
+          <a:chExt cx="0" cy="0"/>
+        </a:xfrm>
+      </p:grpSpPr>
+      <p:sp>
+        <p:nvSpPr>
+          <p:cNvPr id="7" name="Rectangle 6">
+            <a:extLst>
+              <a:ext uri="{FF2B5EF4-FFF2-40B4-BE49-F238E27FC236}">
+                <a16:creationId xmlns:a16="http://schemas.microsoft.com/office/drawing/2014/main" id="{0D6B89B5-AC95-49E5-8285-E5FD52CB50E4}"/>
+              </a:ext>
+            </a:extLst>
+          </p:cNvPr>
+          <p:cNvSpPr/>
+          <p:nvPr/>
+        </p:nvSpPr>
+        <p:spPr>
+          <a:xfrm>
+            <a:off x="3018971" y="754744"/>
+            <a:ext cx="6952343" cy="6103256"/>
+          </a:xfrm>
+          <a:prstGeom prst="rect">
+            <a:avLst/>
+          </a:prstGeom>
+          <a:solidFill>
+            <a:schemeClr val="bg1"/>
+          </a:solidFill>
+          <a:ln>
+            <a:noFill/>
+          </a:ln>
+        </p:spPr>
+        <p:style>
+          <a:lnRef idx="2">
+            <a:schemeClr val="accent1">
+              <a:shade val="50000"/>
+            </a:schemeClr>
+          </a:lnRef>
+          <a:fillRef idx="1">
+            <a:schemeClr val="accent1"/>
+          </a:fillRef>
+          <a:effectRef idx="0">
+            <a:schemeClr val="accent1"/>
+          </a:effectRef>
+          <a:fontRef idx="minor">
+            <a:schemeClr val="lt1"/>
+          </a:fontRef>
+        </p:style>
+        <p:txBody>
+          <a:bodyPr rtlCol="0" anchor="ctr"/>
+          <a:lstStyle/>
+          <a:p>
+            <a:pPr algn="ctr"/>
+            <a:endParaRPr lang="en-US"/>
+          </a:p>
+        </p:txBody>
+      </p:sp>
+      <p:sp>
+        <p:nvSpPr>
+          <p:cNvPr id="2" name="Title 1">
+            <a:extLst>
+              <a:ext uri="{FF2B5EF4-FFF2-40B4-BE49-F238E27FC236}">
+                <a16:creationId xmlns:a16="http://schemas.microsoft.com/office/drawing/2014/main" id="{CAF6469F-3843-4A2D-A1B3-0A67D1AC0A83}"/>
+              </a:ext>
+            </a:extLst>
+          </p:cNvPr>
+          <p:cNvSpPr>
+            <a:spLocks noGrp="1"/>
+          </p:cNvSpPr>
+          <p:nvPr>
+            <p:ph type="title"/>
+          </p:nvPr>
+        </p:nvSpPr>
+        <p:spPr>
+          <a:xfrm>
+            <a:off x="1449500" y="-409571"/>
+            <a:ext cx="10018713" cy="1752599"/>
+          </a:xfrm>
+        </p:spPr>
+        <p:txBody>
+          <a:bodyPr/>
+          <a:lstStyle/>
+          <a:p>
+            <a:r>
+              <a:rPr lang="en-US" dirty="0"/>
+              <a:t>Use Case Diagram</a:t>
+            </a:r>
+          </a:p>
+        </p:txBody>
+      </p:sp>
+      <p:pic>
+        <p:nvPicPr>
+          <p:cNvPr id="5" name="Picture 4">
+            <a:extLst>
+              <a:ext uri="{FF2B5EF4-FFF2-40B4-BE49-F238E27FC236}">
+                <a16:creationId xmlns:a16="http://schemas.microsoft.com/office/drawing/2014/main" id="{79A98FE9-4A08-419B-87C9-ED8BFAA971A9}"/>
+              </a:ext>
+            </a:extLst>
+          </p:cNvPr>
+          <p:cNvPicPr>
+            <a:picLocks noChangeAspect="1"/>
+          </p:cNvPicPr>
+          <p:nvPr/>
+        </p:nvPicPr>
+        <p:blipFill>
+          <a:blip r:embed="rId2"/>
+          <a:stretch>
+            <a:fillRect/>
+          </a:stretch>
+        </p:blipFill>
+        <p:spPr>
+          <a:xfrm>
+            <a:off x="3338172" y="2913518"/>
+            <a:ext cx="876300" cy="1343025"/>
+          </a:xfrm>
+          <a:prstGeom prst="rect">
+            <a:avLst/>
+          </a:prstGeom>
+        </p:spPr>
+      </p:pic>
+      <p:pic>
+        <p:nvPicPr>
+          <p:cNvPr id="6" name="Picture 5">
+            <a:extLst>
+              <a:ext uri="{FF2B5EF4-FFF2-40B4-BE49-F238E27FC236}">
+                <a16:creationId xmlns:a16="http://schemas.microsoft.com/office/drawing/2014/main" id="{EE84BDA8-E085-4A27-B0A3-064045A1F010}"/>
+              </a:ext>
+            </a:extLst>
+          </p:cNvPr>
+          <p:cNvPicPr>
+            <a:picLocks noChangeAspect="1"/>
+          </p:cNvPicPr>
+          <p:nvPr/>
+        </p:nvPicPr>
+        <p:blipFill>
+          <a:blip r:embed="rId3"/>
+          <a:stretch>
+            <a:fillRect/>
+          </a:stretch>
+        </p:blipFill>
+        <p:spPr>
+          <a:xfrm>
+            <a:off x="8812722" y="2984956"/>
+            <a:ext cx="695325" cy="1200150"/>
+          </a:xfrm>
+          <a:prstGeom prst="rect">
+            <a:avLst/>
+          </a:prstGeom>
+        </p:spPr>
+      </p:pic>
+      <p:sp>
+        <p:nvSpPr>
+          <p:cNvPr id="10" name="Rectangle 9">
+            <a:extLst>
+              <a:ext uri="{FF2B5EF4-FFF2-40B4-BE49-F238E27FC236}">
+                <a16:creationId xmlns:a16="http://schemas.microsoft.com/office/drawing/2014/main" id="{55A93EB8-A8B2-4734-898F-B950927DFD69}"/>
+              </a:ext>
+            </a:extLst>
+          </p:cNvPr>
+          <p:cNvSpPr/>
+          <p:nvPr/>
+        </p:nvSpPr>
+        <p:spPr>
+          <a:xfrm>
+            <a:off x="4767943" y="885372"/>
+            <a:ext cx="3381829" cy="5834741"/>
+          </a:xfrm>
+          <a:prstGeom prst="rect">
+            <a:avLst/>
+          </a:prstGeom>
+          <a:solidFill>
+            <a:schemeClr val="bg1"/>
+          </a:solidFill>
+          <a:ln w="28575">
+            <a:solidFill>
+              <a:schemeClr val="tx1"/>
+            </a:solidFill>
+          </a:ln>
+        </p:spPr>
+        <p:style>
+          <a:lnRef idx="2">
+            <a:schemeClr val="accent1">
+              <a:shade val="50000"/>
+            </a:schemeClr>
+          </a:lnRef>
+          <a:fillRef idx="1">
+            <a:schemeClr val="accent1"/>
+          </a:fillRef>
+          <a:effectRef idx="0">
+            <a:schemeClr val="accent1"/>
+          </a:effectRef>
+          <a:fontRef idx="minor">
+            <a:schemeClr val="lt1"/>
+          </a:fontRef>
+        </p:style>
+        <p:txBody>
+          <a:bodyPr rtlCol="0" anchor="ctr"/>
+          <a:lstStyle/>
+          <a:p>
+            <a:pPr algn="ctr"/>
+            <a:endParaRPr lang="en-US"/>
+          </a:p>
+        </p:txBody>
+      </p:sp>
+      <p:sp>
+        <p:nvSpPr>
+          <p:cNvPr id="12" name="Oval 11">
+            <a:extLst>
+              <a:ext uri="{FF2B5EF4-FFF2-40B4-BE49-F238E27FC236}">
+                <a16:creationId xmlns:a16="http://schemas.microsoft.com/office/drawing/2014/main" id="{CF40FF98-A0AD-414E-A6FD-9124E7D91F7F}"/>
+              </a:ext>
+            </a:extLst>
+          </p:cNvPr>
+          <p:cNvSpPr/>
+          <p:nvPr/>
+        </p:nvSpPr>
+        <p:spPr>
+          <a:xfrm>
+            <a:off x="5297714" y="1331686"/>
+            <a:ext cx="2322286" cy="783771"/>
+          </a:xfrm>
+          <a:prstGeom prst="ellipse">
+            <a:avLst/>
+          </a:prstGeom>
+          <a:solidFill>
+            <a:schemeClr val="bg1"/>
+          </a:solidFill>
+          <a:ln w="28575">
+            <a:solidFill>
+              <a:schemeClr val="tx1"/>
+            </a:solidFill>
+          </a:ln>
+        </p:spPr>
+        <p:style>
+          <a:lnRef idx="2">
+            <a:schemeClr val="accent1">
+              <a:shade val="50000"/>
+            </a:schemeClr>
+          </a:lnRef>
+          <a:fillRef idx="1">
+            <a:schemeClr val="accent1"/>
+          </a:fillRef>
+          <a:effectRef idx="0">
+            <a:schemeClr val="accent1"/>
+          </a:effectRef>
+          <a:fontRef idx="minor">
+            <a:schemeClr val="lt1"/>
+          </a:fontRef>
+        </p:style>
+        <p:txBody>
+          <a:bodyPr rtlCol="0" anchor="ctr"/>
+          <a:lstStyle/>
+          <a:p>
+            <a:pPr algn="ctr"/>
+            <a:r>
+              <a:rPr lang="en-US" dirty="0">
+                <a:solidFill>
+                  <a:schemeClr val="tx1"/>
+                </a:solidFill>
+              </a:rPr>
+              <a:t>Find Volunteer Events </a:t>
+            </a:r>
+          </a:p>
+        </p:txBody>
+      </p:sp>
+      <p:sp>
+        <p:nvSpPr>
+          <p:cNvPr id="13" name="Oval 12">
+            <a:extLst>
+              <a:ext uri="{FF2B5EF4-FFF2-40B4-BE49-F238E27FC236}">
+                <a16:creationId xmlns:a16="http://schemas.microsoft.com/office/drawing/2014/main" id="{2378CA94-5847-4FE5-BAEA-0D4E3947C6DE}"/>
+              </a:ext>
+            </a:extLst>
+          </p:cNvPr>
+          <p:cNvSpPr/>
+          <p:nvPr/>
+        </p:nvSpPr>
+        <p:spPr>
+          <a:xfrm>
+            <a:off x="5297714" y="5812975"/>
+            <a:ext cx="2322286" cy="783771"/>
+          </a:xfrm>
+          <a:prstGeom prst="ellipse">
+            <a:avLst/>
+          </a:prstGeom>
+          <a:solidFill>
+            <a:schemeClr val="bg1"/>
+          </a:solidFill>
+          <a:ln w="28575">
+            <a:solidFill>
+              <a:schemeClr val="tx1"/>
+            </a:solidFill>
+          </a:ln>
+        </p:spPr>
+        <p:style>
+          <a:lnRef idx="2">
+            <a:schemeClr val="accent1">
+              <a:shade val="50000"/>
+            </a:schemeClr>
+          </a:lnRef>
+          <a:fillRef idx="1">
+            <a:schemeClr val="accent1"/>
+          </a:fillRef>
+          <a:effectRef idx="0">
+            <a:schemeClr val="accent1"/>
+          </a:effectRef>
+          <a:fontRef idx="minor">
+            <a:schemeClr val="lt1"/>
+          </a:fontRef>
+        </p:style>
+        <p:txBody>
+          <a:bodyPr rot="0" spcFirstLastPara="0" vertOverflow="overflow" horzOverflow="overflow" vert="horz" wrap="square" lIns="91440" tIns="45720" rIns="91440" bIns="45720" numCol="1" spcCol="0" rtlCol="0" fromWordArt="0" anchor="ctr" anchorCtr="0" forceAA="0" compatLnSpc="1">
+            <a:prstTxWarp prst="textNoShape">
+              <a:avLst/>
+            </a:prstTxWarp>
+            <a:noAutofit/>
+          </a:bodyPr>
+          <a:lstStyle/>
+          <a:p>
+            <a:pPr algn="ctr"/>
+            <a:r>
+              <a:rPr lang="en-US" dirty="0">
+                <a:solidFill>
+                  <a:schemeClr val="tx1"/>
+                </a:solidFill>
+              </a:rPr>
+              <a:t>Post Volunteer Events </a:t>
+            </a:r>
+          </a:p>
+        </p:txBody>
+      </p:sp>
+      <p:sp>
+        <p:nvSpPr>
+          <p:cNvPr id="14" name="Oval 13">
+            <a:extLst>
+              <a:ext uri="{FF2B5EF4-FFF2-40B4-BE49-F238E27FC236}">
+                <a16:creationId xmlns:a16="http://schemas.microsoft.com/office/drawing/2014/main" id="{939D0A18-B547-48FB-AD00-9BE6AB601D6A}"/>
+              </a:ext>
+            </a:extLst>
+          </p:cNvPr>
+          <p:cNvSpPr/>
+          <p:nvPr/>
+        </p:nvSpPr>
+        <p:spPr>
+          <a:xfrm>
+            <a:off x="5297714" y="2227944"/>
+            <a:ext cx="2322286" cy="783771"/>
+          </a:xfrm>
+          <a:prstGeom prst="ellipse">
+            <a:avLst/>
+          </a:prstGeom>
+          <a:solidFill>
+            <a:schemeClr val="bg1"/>
+          </a:solidFill>
+          <a:ln w="28575">
+            <a:solidFill>
+              <a:schemeClr val="tx1"/>
+            </a:solidFill>
+          </a:ln>
+        </p:spPr>
+        <p:style>
+          <a:lnRef idx="2">
+            <a:schemeClr val="accent1">
+              <a:shade val="50000"/>
+            </a:schemeClr>
+          </a:lnRef>
+          <a:fillRef idx="1">
+            <a:schemeClr val="accent1"/>
+          </a:fillRef>
+          <a:effectRef idx="0">
+            <a:schemeClr val="accent1"/>
+          </a:effectRef>
+          <a:fontRef idx="minor">
+            <a:schemeClr val="lt1"/>
+          </a:fontRef>
+        </p:style>
+        <p:txBody>
+          <a:bodyPr rot="0" spcFirstLastPara="0" vertOverflow="overflow" horzOverflow="overflow" vert="horz" wrap="square" lIns="91440" tIns="45720" rIns="91440" bIns="45720" numCol="1" spcCol="0" rtlCol="0" fromWordArt="0" anchor="ctr" anchorCtr="0" forceAA="0" compatLnSpc="1">
+            <a:prstTxWarp prst="textNoShape">
+              <a:avLst/>
+            </a:prstTxWarp>
+            <a:noAutofit/>
+          </a:bodyPr>
+          <a:lstStyle/>
+          <a:p>
+            <a:pPr algn="ctr"/>
+            <a:r>
+              <a:rPr lang="en-US" dirty="0">
+                <a:solidFill>
+                  <a:schemeClr val="tx1"/>
+                </a:solidFill>
+              </a:rPr>
+              <a:t>Connect with organizations</a:t>
+            </a:r>
+          </a:p>
+        </p:txBody>
+      </p:sp>
+      <p:sp>
+        <p:nvSpPr>
+          <p:cNvPr id="15" name="Oval 14">
+            <a:extLst>
+              <a:ext uri="{FF2B5EF4-FFF2-40B4-BE49-F238E27FC236}">
+                <a16:creationId xmlns:a16="http://schemas.microsoft.com/office/drawing/2014/main" id="{0AD9CD0F-B0A7-4E61-8E0D-C0BE61CB9452}"/>
+              </a:ext>
+            </a:extLst>
+          </p:cNvPr>
+          <p:cNvSpPr/>
+          <p:nvPr/>
+        </p:nvSpPr>
+        <p:spPr>
+          <a:xfrm>
+            <a:off x="5297714" y="4916718"/>
+            <a:ext cx="2322286" cy="783771"/>
+          </a:xfrm>
+          <a:prstGeom prst="ellipse">
+            <a:avLst/>
+          </a:prstGeom>
+          <a:solidFill>
+            <a:schemeClr val="bg1"/>
+          </a:solidFill>
+          <a:ln w="28575">
+            <a:solidFill>
+              <a:schemeClr val="tx1"/>
+            </a:solidFill>
+          </a:ln>
+        </p:spPr>
+        <p:style>
+          <a:lnRef idx="2">
+            <a:schemeClr val="accent1">
+              <a:shade val="50000"/>
+            </a:schemeClr>
+          </a:lnRef>
+          <a:fillRef idx="1">
+            <a:schemeClr val="accent1"/>
+          </a:fillRef>
+          <a:effectRef idx="0">
+            <a:schemeClr val="accent1"/>
+          </a:effectRef>
+          <a:fontRef idx="minor">
+            <a:schemeClr val="lt1"/>
+          </a:fontRef>
+        </p:style>
+        <p:txBody>
+          <a:bodyPr rot="0" spcFirstLastPara="0" vertOverflow="overflow" horzOverflow="overflow" vert="horz" wrap="square" lIns="91440" tIns="45720" rIns="91440" bIns="45720" numCol="1" spcCol="0" rtlCol="0" fromWordArt="0" anchor="ctr" anchorCtr="0" forceAA="0" compatLnSpc="1">
+            <a:prstTxWarp prst="textNoShape">
+              <a:avLst/>
+            </a:prstTxWarp>
+            <a:noAutofit/>
+          </a:bodyPr>
+          <a:lstStyle/>
+          <a:p>
+            <a:pPr algn="ctr"/>
+            <a:r>
+              <a:rPr lang="en-US" dirty="0">
+                <a:solidFill>
+                  <a:schemeClr val="tx1"/>
+                </a:solidFill>
+              </a:rPr>
+              <a:t>Connect with organizations</a:t>
+            </a:r>
+          </a:p>
+        </p:txBody>
+      </p:sp>
+      <p:sp>
+        <p:nvSpPr>
+          <p:cNvPr id="16" name="Oval 15">
+            <a:extLst>
+              <a:ext uri="{FF2B5EF4-FFF2-40B4-BE49-F238E27FC236}">
+                <a16:creationId xmlns:a16="http://schemas.microsoft.com/office/drawing/2014/main" id="{2A8095C2-A648-428B-9DA5-D480C2DAD80B}"/>
+              </a:ext>
+            </a:extLst>
+          </p:cNvPr>
+          <p:cNvSpPr/>
+          <p:nvPr/>
+        </p:nvSpPr>
+        <p:spPr>
+          <a:xfrm>
+            <a:off x="5297714" y="3124202"/>
+            <a:ext cx="2322286" cy="783771"/>
+          </a:xfrm>
+          <a:prstGeom prst="ellipse">
+            <a:avLst/>
+          </a:prstGeom>
+          <a:solidFill>
+            <a:schemeClr val="bg1"/>
+          </a:solidFill>
+          <a:ln w="28575">
+            <a:solidFill>
+              <a:schemeClr val="tx1"/>
+            </a:solidFill>
+          </a:ln>
+        </p:spPr>
+        <p:style>
+          <a:lnRef idx="2">
+            <a:schemeClr val="accent1">
+              <a:shade val="50000"/>
+            </a:schemeClr>
+          </a:lnRef>
+          <a:fillRef idx="1">
+            <a:schemeClr val="accent1"/>
+          </a:fillRef>
+          <a:effectRef idx="0">
+            <a:schemeClr val="accent1"/>
+          </a:effectRef>
+          <a:fontRef idx="minor">
+            <a:schemeClr val="lt1"/>
+          </a:fontRef>
+        </p:style>
+        <p:txBody>
+          <a:bodyPr rot="0" spcFirstLastPara="0" vertOverflow="overflow" horzOverflow="overflow" vert="horz" wrap="square" lIns="91440" tIns="45720" rIns="91440" bIns="45720" numCol="1" spcCol="0" rtlCol="0" fromWordArt="0" anchor="ctr" anchorCtr="0" forceAA="0" compatLnSpc="1">
+            <a:prstTxWarp prst="textNoShape">
+              <a:avLst/>
+            </a:prstTxWarp>
+            <a:noAutofit/>
+          </a:bodyPr>
+          <a:lstStyle/>
+          <a:p>
+            <a:pPr algn="ctr"/>
+            <a:r>
+              <a:rPr lang="en-US" dirty="0">
+                <a:solidFill>
+                  <a:schemeClr val="tx1"/>
+                </a:solidFill>
+              </a:rPr>
+              <a:t>Track Hours Volunteered</a:t>
+            </a:r>
+          </a:p>
+        </p:txBody>
+      </p:sp>
+      <p:sp>
+        <p:nvSpPr>
+          <p:cNvPr id="9" name="TextBox 8">
+            <a:extLst>
+              <a:ext uri="{FF2B5EF4-FFF2-40B4-BE49-F238E27FC236}">
+                <a16:creationId xmlns:a16="http://schemas.microsoft.com/office/drawing/2014/main" id="{A2676266-1A07-4420-B6F4-F7C87ED6885A}"/>
+              </a:ext>
+            </a:extLst>
+          </p:cNvPr>
+          <p:cNvSpPr txBox="1"/>
+          <p:nvPr/>
+        </p:nvSpPr>
+        <p:spPr>
+          <a:xfrm>
+            <a:off x="4542971" y="957944"/>
+            <a:ext cx="3831772" cy="369332"/>
+          </a:xfrm>
+          <a:prstGeom prst="rect">
+            <a:avLst/>
+          </a:prstGeom>
+          <a:noFill/>
+        </p:spPr>
+        <p:txBody>
+          <a:bodyPr wrap="square" rtlCol="0">
+            <a:spAutoFit/>
+          </a:bodyPr>
+          <a:lstStyle/>
+          <a:p>
+            <a:pPr algn="ctr"/>
+            <a:r>
+              <a:rPr lang="en-US" b="1" dirty="0"/>
+              <a:t>Good Works El Paso</a:t>
+            </a:r>
+          </a:p>
+        </p:txBody>
+      </p:sp>
+      <p:sp>
+        <p:nvSpPr>
+          <p:cNvPr id="17" name="Oval 16">
+            <a:extLst>
+              <a:ext uri="{FF2B5EF4-FFF2-40B4-BE49-F238E27FC236}">
+                <a16:creationId xmlns:a16="http://schemas.microsoft.com/office/drawing/2014/main" id="{0C00ED0F-CE4C-44DA-BEE7-B16B7D31FA19}"/>
+              </a:ext>
+            </a:extLst>
+          </p:cNvPr>
+          <p:cNvSpPr/>
+          <p:nvPr/>
+        </p:nvSpPr>
+        <p:spPr>
+          <a:xfrm>
+            <a:off x="5297714" y="4020460"/>
+            <a:ext cx="2322286" cy="783771"/>
+          </a:xfrm>
+          <a:prstGeom prst="ellipse">
+            <a:avLst/>
+          </a:prstGeom>
+          <a:solidFill>
+            <a:schemeClr val="bg1"/>
+          </a:solidFill>
+          <a:ln w="28575">
+            <a:solidFill>
+              <a:schemeClr val="tx1"/>
+            </a:solidFill>
+          </a:ln>
+        </p:spPr>
+        <p:style>
+          <a:lnRef idx="2">
+            <a:schemeClr val="accent1">
+              <a:shade val="50000"/>
+            </a:schemeClr>
+          </a:lnRef>
+          <a:fillRef idx="1">
+            <a:schemeClr val="accent1"/>
+          </a:fillRef>
+          <a:effectRef idx="0">
+            <a:schemeClr val="accent1"/>
+          </a:effectRef>
+          <a:fontRef idx="minor">
+            <a:schemeClr val="lt1"/>
+          </a:fontRef>
+        </p:style>
+        <p:txBody>
+          <a:bodyPr rot="0" spcFirstLastPara="0" vertOverflow="overflow" horzOverflow="overflow" vert="horz" wrap="square" lIns="91440" tIns="45720" rIns="91440" bIns="45720" numCol="1" spcCol="0" rtlCol="0" fromWordArt="0" anchor="ctr" anchorCtr="0" forceAA="0" compatLnSpc="1">
+            <a:prstTxWarp prst="textNoShape">
+              <a:avLst/>
+            </a:prstTxWarp>
+            <a:noAutofit/>
+          </a:bodyPr>
+          <a:lstStyle/>
+          <a:p>
+            <a:pPr algn="ctr"/>
+            <a:r>
+              <a:rPr lang="en-US" b="1" dirty="0">
+                <a:solidFill>
+                  <a:srgbClr val="FF0000"/>
+                </a:solidFill>
+              </a:rPr>
+              <a:t>Get together to do good</a:t>
+            </a:r>
+          </a:p>
+        </p:txBody>
+      </p:sp>
+      <p:cxnSp>
+        <p:nvCxnSpPr>
+          <p:cNvPr id="24" name="Straight Connector 23">
+            <a:extLst>
+              <a:ext uri="{FF2B5EF4-FFF2-40B4-BE49-F238E27FC236}">
+                <a16:creationId xmlns:a16="http://schemas.microsoft.com/office/drawing/2014/main" id="{7ADB4FF7-6696-4442-AF52-4B424B705387}"/>
+              </a:ext>
+            </a:extLst>
+          </p:cNvPr>
+          <p:cNvCxnSpPr>
+            <a:stCxn id="5" idx="3"/>
+            <a:endCxn id="12" idx="2"/>
+          </p:cNvCxnSpPr>
+          <p:nvPr/>
+        </p:nvCxnSpPr>
+        <p:spPr>
+          <a:xfrm flipV="1">
+            <a:off x="4214472" y="1723572"/>
+            <a:ext cx="1083242" cy="1861459"/>
+          </a:xfrm>
+          <a:prstGeom prst="line">
+            <a:avLst/>
+          </a:prstGeom>
+          <a:ln w="28575">
+            <a:solidFill>
+              <a:schemeClr val="tx1"/>
+            </a:solidFill>
+          </a:ln>
+        </p:spPr>
+        <p:style>
+          <a:lnRef idx="1">
+            <a:schemeClr val="accent1"/>
+          </a:lnRef>
+          <a:fillRef idx="0">
+            <a:schemeClr val="accent1"/>
+          </a:fillRef>
+          <a:effectRef idx="0">
+            <a:schemeClr val="accent1"/>
+          </a:effectRef>
+          <a:fontRef idx="minor">
+            <a:schemeClr val="tx1"/>
+          </a:fontRef>
+        </p:style>
+      </p:cxnSp>
+      <p:cxnSp>
+        <p:nvCxnSpPr>
+          <p:cNvPr id="26" name="Straight Connector 25">
+            <a:extLst>
+              <a:ext uri="{FF2B5EF4-FFF2-40B4-BE49-F238E27FC236}">
+                <a16:creationId xmlns:a16="http://schemas.microsoft.com/office/drawing/2014/main" id="{AADF4822-7F1C-4645-942D-8C8D97D56F25}"/>
+              </a:ext>
+            </a:extLst>
+          </p:cNvPr>
+          <p:cNvCxnSpPr>
+            <a:cxnSpLocks/>
+            <a:stCxn id="13" idx="6"/>
+            <a:endCxn id="6" idx="1"/>
+          </p:cNvCxnSpPr>
+          <p:nvPr/>
+        </p:nvCxnSpPr>
+        <p:spPr>
+          <a:xfrm flipV="1">
+            <a:off x="7620000" y="3585031"/>
+            <a:ext cx="1192722" cy="2619830"/>
+          </a:xfrm>
+          <a:prstGeom prst="line">
+            <a:avLst/>
+          </a:prstGeom>
+          <a:ln w="28575">
+            <a:solidFill>
+              <a:schemeClr val="tx1"/>
+            </a:solidFill>
+          </a:ln>
+        </p:spPr>
+        <p:style>
+          <a:lnRef idx="1">
+            <a:schemeClr val="accent1"/>
+          </a:lnRef>
+          <a:fillRef idx="0">
+            <a:schemeClr val="accent1"/>
+          </a:fillRef>
+          <a:effectRef idx="0">
+            <a:schemeClr val="accent1"/>
+          </a:effectRef>
+          <a:fontRef idx="minor">
+            <a:schemeClr val="tx1"/>
+          </a:fontRef>
+        </p:style>
+      </p:cxnSp>
+      <p:cxnSp>
+        <p:nvCxnSpPr>
+          <p:cNvPr id="27" name="Straight Connector 26">
+            <a:extLst>
+              <a:ext uri="{FF2B5EF4-FFF2-40B4-BE49-F238E27FC236}">
+                <a16:creationId xmlns:a16="http://schemas.microsoft.com/office/drawing/2014/main" id="{A4520099-9719-464E-8DE0-A65BD94F973F}"/>
+              </a:ext>
+            </a:extLst>
+          </p:cNvPr>
+          <p:cNvCxnSpPr>
+            <a:cxnSpLocks/>
+            <a:stCxn id="6" idx="1"/>
+            <a:endCxn id="15" idx="6"/>
+          </p:cNvCxnSpPr>
+          <p:nvPr/>
+        </p:nvCxnSpPr>
+        <p:spPr>
+          <a:xfrm flipH="1">
+            <a:off x="7620000" y="3585031"/>
+            <a:ext cx="1192722" cy="1723573"/>
+          </a:xfrm>
+          <a:prstGeom prst="line">
+            <a:avLst/>
+          </a:prstGeom>
+          <a:ln w="28575">
+            <a:solidFill>
+              <a:schemeClr val="tx1"/>
+            </a:solidFill>
+          </a:ln>
+        </p:spPr>
+        <p:style>
+          <a:lnRef idx="1">
+            <a:schemeClr val="accent1"/>
+          </a:lnRef>
+          <a:fillRef idx="0">
+            <a:schemeClr val="accent1"/>
+          </a:fillRef>
+          <a:effectRef idx="0">
+            <a:schemeClr val="accent1"/>
+          </a:effectRef>
+          <a:fontRef idx="minor">
+            <a:schemeClr val="tx1"/>
+          </a:fontRef>
+        </p:style>
+      </p:cxnSp>
+      <p:cxnSp>
+        <p:nvCxnSpPr>
+          <p:cNvPr id="28" name="Straight Connector 27">
+            <a:extLst>
+              <a:ext uri="{FF2B5EF4-FFF2-40B4-BE49-F238E27FC236}">
+                <a16:creationId xmlns:a16="http://schemas.microsoft.com/office/drawing/2014/main" id="{CB11A488-D93B-4183-BA14-4BAF7EF7B536}"/>
+              </a:ext>
+            </a:extLst>
+          </p:cNvPr>
+          <p:cNvCxnSpPr>
+            <a:cxnSpLocks/>
+            <a:stCxn id="17" idx="6"/>
+            <a:endCxn id="6" idx="1"/>
+          </p:cNvCxnSpPr>
+          <p:nvPr/>
+        </p:nvCxnSpPr>
+        <p:spPr>
+          <a:xfrm flipV="1">
+            <a:off x="7620000" y="3585031"/>
+            <a:ext cx="1192722" cy="827315"/>
+          </a:xfrm>
+          <a:prstGeom prst="line">
+            <a:avLst/>
+          </a:prstGeom>
+          <a:ln w="28575">
+            <a:solidFill>
+              <a:schemeClr val="tx1"/>
+            </a:solidFill>
+          </a:ln>
+        </p:spPr>
+        <p:style>
+          <a:lnRef idx="1">
+            <a:schemeClr val="accent1"/>
+          </a:lnRef>
+          <a:fillRef idx="0">
+            <a:schemeClr val="accent1"/>
+          </a:fillRef>
+          <a:effectRef idx="0">
+            <a:schemeClr val="accent1"/>
+          </a:effectRef>
+          <a:fontRef idx="minor">
+            <a:schemeClr val="tx1"/>
+          </a:fontRef>
+        </p:style>
+      </p:cxnSp>
+      <p:cxnSp>
+        <p:nvCxnSpPr>
+          <p:cNvPr id="29" name="Straight Connector 28">
+            <a:extLst>
+              <a:ext uri="{FF2B5EF4-FFF2-40B4-BE49-F238E27FC236}">
+                <a16:creationId xmlns:a16="http://schemas.microsoft.com/office/drawing/2014/main" id="{791A3994-8F15-4B2F-AC2B-B988BD5F0219}"/>
+              </a:ext>
+            </a:extLst>
+          </p:cNvPr>
+          <p:cNvCxnSpPr>
+            <a:cxnSpLocks/>
+            <a:endCxn id="17" idx="2"/>
+          </p:cNvCxnSpPr>
+          <p:nvPr/>
+        </p:nvCxnSpPr>
+        <p:spPr>
+          <a:xfrm>
+            <a:off x="4214472" y="3573007"/>
+            <a:ext cx="1083242" cy="839339"/>
+          </a:xfrm>
+          <a:prstGeom prst="line">
+            <a:avLst/>
+          </a:prstGeom>
+          <a:ln w="28575">
+            <a:solidFill>
+              <a:schemeClr val="tx1"/>
+            </a:solidFill>
+          </a:ln>
+        </p:spPr>
+        <p:style>
+          <a:lnRef idx="1">
+            <a:schemeClr val="accent1"/>
+          </a:lnRef>
+          <a:fillRef idx="0">
+            <a:schemeClr val="accent1"/>
+          </a:fillRef>
+          <a:effectRef idx="0">
+            <a:schemeClr val="accent1"/>
+          </a:effectRef>
+          <a:fontRef idx="minor">
+            <a:schemeClr val="tx1"/>
+          </a:fontRef>
+        </p:style>
+      </p:cxnSp>
+      <p:cxnSp>
+        <p:nvCxnSpPr>
+          <p:cNvPr id="30" name="Straight Connector 29">
+            <a:extLst>
+              <a:ext uri="{FF2B5EF4-FFF2-40B4-BE49-F238E27FC236}">
+                <a16:creationId xmlns:a16="http://schemas.microsoft.com/office/drawing/2014/main" id="{0BC177E6-AF60-435C-829B-146D843DFFC9}"/>
+              </a:ext>
+            </a:extLst>
+          </p:cNvPr>
+          <p:cNvCxnSpPr>
+            <a:cxnSpLocks/>
+            <a:endCxn id="16" idx="2"/>
+          </p:cNvCxnSpPr>
+          <p:nvPr/>
+        </p:nvCxnSpPr>
+        <p:spPr>
+          <a:xfrm flipV="1">
+            <a:off x="4214472" y="3516088"/>
+            <a:ext cx="1083242" cy="56919"/>
+          </a:xfrm>
+          <a:prstGeom prst="line">
+            <a:avLst/>
+          </a:prstGeom>
+          <a:ln w="28575">
+            <a:solidFill>
+              <a:schemeClr val="tx1"/>
+            </a:solidFill>
+          </a:ln>
+        </p:spPr>
+        <p:style>
+          <a:lnRef idx="1">
+            <a:schemeClr val="accent1"/>
+          </a:lnRef>
+          <a:fillRef idx="0">
+            <a:schemeClr val="accent1"/>
+          </a:fillRef>
+          <a:effectRef idx="0">
+            <a:schemeClr val="accent1"/>
+          </a:effectRef>
+          <a:fontRef idx="minor">
+            <a:schemeClr val="tx1"/>
+          </a:fontRef>
+        </p:style>
+      </p:cxnSp>
+      <p:cxnSp>
+        <p:nvCxnSpPr>
+          <p:cNvPr id="31" name="Straight Connector 30">
+            <a:extLst>
+              <a:ext uri="{FF2B5EF4-FFF2-40B4-BE49-F238E27FC236}">
+                <a16:creationId xmlns:a16="http://schemas.microsoft.com/office/drawing/2014/main" id="{72F353AD-EF79-4EBD-B6FC-D4C6D95FABA4}"/>
+              </a:ext>
+            </a:extLst>
+          </p:cNvPr>
+          <p:cNvCxnSpPr>
+            <a:cxnSpLocks/>
+            <a:endCxn id="14" idx="2"/>
+          </p:cNvCxnSpPr>
+          <p:nvPr/>
+        </p:nvCxnSpPr>
+        <p:spPr>
+          <a:xfrm flipV="1">
+            <a:off x="4214472" y="2619830"/>
+            <a:ext cx="1083242" cy="965200"/>
+          </a:xfrm>
+          <a:prstGeom prst="line">
+            <a:avLst/>
+          </a:prstGeom>
+          <a:ln w="28575">
+            <a:solidFill>
+              <a:schemeClr val="tx1"/>
+            </a:solidFill>
+          </a:ln>
+        </p:spPr>
+        <p:style>
+          <a:lnRef idx="1">
+            <a:schemeClr val="accent1"/>
+          </a:lnRef>
+          <a:fillRef idx="0">
+            <a:schemeClr val="accent1"/>
+          </a:fillRef>
+          <a:effectRef idx="0">
+            <a:schemeClr val="accent1"/>
+          </a:effectRef>
+          <a:fontRef idx="minor">
+            <a:schemeClr val="tx1"/>
+          </a:fontRef>
+        </p:style>
+      </p:cxnSp>
+    </p:spTree>
+    <p:extLst>
+      <p:ext uri="{BB962C8B-B14F-4D97-AF65-F5344CB8AC3E}">
+        <p14:creationId xmlns:p14="http://schemas.microsoft.com/office/powerpoint/2010/main" val="390962756"/>
+      </p:ext>
+    </p:extLst>
+  </p:cSld>
+  <p:clrMapOvr>
+    <a:masterClrMapping/>
+  </p:clrMapOvr>
+</p:sld>
+</file>
+
+<file path=ppt/slides/slide15.xml><?xml version="1.0" encoding="utf-8"?>
 <p:sld xmlns:a="http://schemas.openxmlformats.org/drawingml/2006/main" xmlns:r="http://schemas.openxmlformats.org/officeDocument/2006/relationships" xmlns:p="http://schemas.openxmlformats.org/presentationml/2006/main">
   <p:cSld>
     <p:spTree>

</xml_diff>